<commit_message>
Adeed core aplication tests
</commit_message>
<xml_diff>
--- a/frontend/packager/base.pptx
+++ b/frontend/packager/base.pptx
@@ -259,7 +259,7 @@
           <a:p>
             <a:fld id="{A7E97B2A-992F-4E4A-AEBD-5C968AD7CF70}" type="datetimeFigureOut">
               <a:rPr lang="de-DE" smtClean="0"/>
-              <a:t>18.03.2022</a:t>
+              <a:t>22.03.2022</a:t>
             </a:fld>
             <a:endParaRPr lang="de-DE"/>
           </a:p>
@@ -500,7 +500,7 @@
           <a:p>
             <a:fld id="{A7E97B2A-992F-4E4A-AEBD-5C968AD7CF70}" type="datetimeFigureOut">
               <a:rPr lang="de-DE" smtClean="0"/>
-              <a:t>18.03.2022</a:t>
+              <a:t>22.03.2022</a:t>
             </a:fld>
             <a:endParaRPr lang="de-DE"/>
           </a:p>
@@ -926,96 +926,17 @@
         <p:spPr/>
         <p:txBody>
           <a:bodyPr>
-            <a:normAutofit fontScale="90000"/>
+            <a:normAutofit/>
           </a:bodyPr>
           <a:lstStyle/>
           <a:p>
             <a:r>
               <a:rPr lang="de-DE" dirty="0" err="1"/>
-              <a:t>If</a:t>
+              <a:t>TestSlode</a:t>
             </a:r>
             <a:r>
               <a:rPr lang="de-DE" dirty="0"/>
-              <a:t> </a:t>
-            </a:r>
-            <a:r>
-              <a:rPr lang="de-DE" dirty="0" err="1"/>
-              <a:t>this</a:t>
-            </a:r>
-            <a:r>
-              <a:rPr lang="de-DE" dirty="0"/>
-              <a:t> </a:t>
-            </a:r>
-            <a:r>
-              <a:rPr lang="de-DE" dirty="0" err="1"/>
-              <a:t>slide</a:t>
-            </a:r>
-            <a:r>
-              <a:rPr lang="de-DE" dirty="0"/>
-              <a:t> </a:t>
-            </a:r>
-            <a:r>
-              <a:rPr lang="de-DE" dirty="0" err="1"/>
-              <a:t>is</a:t>
-            </a:r>
-            <a:r>
-              <a:rPr lang="de-DE" dirty="0"/>
-              <a:t> </a:t>
-            </a:r>
-            <a:r>
-              <a:rPr lang="de-DE" dirty="0" err="1"/>
-              <a:t>present</a:t>
-            </a:r>
-            <a:r>
-              <a:rPr lang="de-DE" dirty="0"/>
-              <a:t> in </a:t>
-            </a:r>
-            <a:r>
-              <a:rPr lang="de-DE" dirty="0" err="1"/>
-              <a:t>the</a:t>
-            </a:r>
-            <a:r>
-              <a:rPr lang="de-DE" dirty="0"/>
-              <a:t> </a:t>
-            </a:r>
-            <a:r>
-              <a:rPr lang="de-DE" dirty="0" err="1"/>
-              <a:t>created</a:t>
-            </a:r>
-            <a:r>
-              <a:rPr lang="de-DE" dirty="0"/>
-              <a:t> </a:t>
-            </a:r>
-            <a:r>
-              <a:rPr lang="de-DE" dirty="0" err="1"/>
-              <a:t>Presentation</a:t>
-            </a:r>
-            <a:r>
-              <a:rPr lang="de-DE" dirty="0"/>
-              <a:t>:</a:t>
-            </a:r>
-            <a:br>
-              <a:rPr lang="de-DE" dirty="0"/>
-            </a:br>
-            <a:r>
-              <a:rPr lang="de-DE" dirty="0"/>
-              <a:t>Delete </a:t>
-            </a:r>
-            <a:r>
-              <a:rPr lang="de-DE" dirty="0" err="1"/>
-              <a:t>this</a:t>
-            </a:r>
-            <a:r>
-              <a:rPr lang="de-DE" dirty="0"/>
-              <a:t> </a:t>
-            </a:r>
-            <a:r>
-              <a:rPr lang="de-DE" dirty="0" err="1"/>
-              <a:t>slide</a:t>
-            </a:r>
-            <a:r>
-              <a:rPr lang="de-DE" dirty="0"/>
-              <a:t>!</a:t>
+              <a:t> 1</a:t>
             </a:r>
           </a:p>
         </p:txBody>
@@ -1047,19 +968,11 @@
             </a:r>
             <a:r>
               <a:rPr lang="de-DE" dirty="0" err="1"/>
-              <a:t>the</a:t>
+              <a:t>no</a:t>
             </a:r>
             <a:r>
               <a:rPr lang="de-DE" dirty="0"/>
-              <a:t> </a:t>
-            </a:r>
-            <a:r>
-              <a:rPr lang="de-DE" dirty="0" err="1"/>
-              <a:t>pptgenerator</a:t>
-            </a:r>
-            <a:r>
-              <a:rPr lang="de-DE" dirty="0"/>
-              <a:t>-team</a:t>
+              <a:t> UID</a:t>
             </a:r>
           </a:p>
         </p:txBody>

</xml_diff>